<commit_message>
saving final project files to submissions
</commit_message>
<xml_diff>
--- a/projects/project-1-final/SAT and ACT Findings.pptx
+++ b/projects/project-1-final/SAT and ACT Findings.pptx
@@ -808,7 +808,7 @@
                   <a:schemeClr val="dk1"/>
                 </a:solidFill>
               </a:rPr>
-              <a:t>Hi my name is Lindsey Roeder and I’m a data scientist.</a:t>
+              <a:t>Hi my name is Lindsey Roeder and I’m a data scientist for the college board.</a:t>
             </a:r>
             <a:endParaRPr>
               <a:solidFill>
@@ -862,7 +862,7 @@
   <p:cSld>
     <p:spTree>
       <p:nvGrpSpPr>
-        <p:cNvPr id="128" name="Shape 128"/>
+        <p:cNvPr id="129" name="Shape 129"/>
         <p:cNvGrpSpPr/>
         <p:nvPr/>
       </p:nvGrpSpPr>
@@ -876,7 +876,7 @@
       </p:grpSpPr>
       <p:sp>
         <p:nvSpPr>
-          <p:cNvPr id="129" name="Google Shape;129;gce690ed560_0_839:notes"/>
+          <p:cNvPr id="130" name="Google Shape;130;gce690ed560_0_839:notes"/>
           <p:cNvSpPr/>
           <p:nvPr>
             <p:ph idx="2" type="sldImg"/>
@@ -911,7 +911,7 @@
       </p:sp>
       <p:sp>
         <p:nvSpPr>
-          <p:cNvPr id="130" name="Google Shape;130;gce690ed560_0_839:notes"/>
+          <p:cNvPr id="131" name="Google Shape;131;gce690ed560_0_839:notes"/>
           <p:cNvSpPr txBox="1"/>
           <p:nvPr>
             <p:ph idx="1" type="body"/>
@@ -1790,7 +1790,7 @@
             </a:pPr>
             <a:r>
               <a:rPr lang="en"/>
-              <a:t>It’s clear that required testing scores in blue are consistently below the average shown in green</a:t>
+              <a:t>It’s clear that required testing scores in blue are consistently below the national average shown in green</a:t>
             </a:r>
             <a:endParaRPr/>
           </a:p>
@@ -1816,6 +1816,23 @@
             <a:r>
               <a:rPr lang="en"/>
               <a:t> above the average</a:t>
+            </a:r>
+            <a:endParaRPr/>
+          </a:p>
+          <a:p>
+            <a:pPr indent="-298450" lvl="1" marL="914400" rtl="0" algn="l">
+              <a:spcBef>
+                <a:spcPts val="0"/>
+              </a:spcBef>
+              <a:spcAft>
+                <a:spcPts val="0"/>
+              </a:spcAft>
+              <a:buSzPts val="1100"/>
+              <a:buChar char="○"/>
+            </a:pPr>
+            <a:r>
+              <a:rPr lang="en"/>
+              <a:t>For this slide I pulled the national average of all students from the college board’s annual reports.</a:t>
             </a:r>
             <a:endParaRPr/>
           </a:p>
@@ -1834,7 +1851,7 @@
   <p:cSld>
     <p:spTree>
       <p:nvGrpSpPr>
-        <p:cNvPr id="87" name="Shape 87"/>
+        <p:cNvPr id="88" name="Shape 88"/>
         <p:cNvGrpSpPr/>
         <p:nvPr/>
       </p:nvGrpSpPr>
@@ -1848,7 +1865,7 @@
       </p:grpSpPr>
       <p:sp>
         <p:nvSpPr>
-          <p:cNvPr id="88" name="Google Shape;88;gce690ed560_0_86:notes"/>
+          <p:cNvPr id="89" name="Google Shape;89;gce690ed560_0_86:notes"/>
           <p:cNvSpPr/>
           <p:nvPr>
             <p:ph idx="2" type="sldImg"/>
@@ -1883,7 +1900,7 @@
       </p:sp>
       <p:sp>
         <p:nvSpPr>
-          <p:cNvPr id="89" name="Google Shape;89;gce690ed560_0_86:notes"/>
+          <p:cNvPr id="90" name="Google Shape;90;gce690ed560_0_86:notes"/>
           <p:cNvSpPr txBox="1"/>
           <p:nvPr>
             <p:ph idx="1" type="body"/>
@@ -1950,7 +1967,15 @@
             </a:pPr>
             <a:r>
               <a:rPr lang="en"/>
-              <a:t>Whereas the red line represents average scores across all states</a:t>
+              <a:t>Whereas the red line represents a combined total score from each state’s </a:t>
+            </a:r>
+            <a:r>
+              <a:rPr lang="en"/>
+              <a:t>individual</a:t>
+            </a:r>
+            <a:r>
+              <a:rPr lang="en"/>
+              <a:t> average</a:t>
             </a:r>
             <a:endParaRPr/>
           </a:p>
@@ -1968,6 +1993,21 @@
             <a:r>
               <a:rPr lang="en"/>
               <a:t>While average scores didn’t decrease at an alarming rate, we should address the concerns and come up with a plan to fix the problem</a:t>
+            </a:r>
+            <a:endParaRPr/>
+          </a:p>
+          <a:p>
+            <a:pPr indent="0" lvl="0" marL="457200" rtl="0" algn="l">
+              <a:spcBef>
+                <a:spcPts val="0"/>
+              </a:spcBef>
+              <a:spcAft>
+                <a:spcPts val="0"/>
+              </a:spcAft>
+              <a:buNone/>
+            </a:pPr>
+            <a:r>
+              <a:t/>
             </a:r>
             <a:endParaRPr/>
           </a:p>
@@ -1986,7 +2026,7 @@
   <p:cSld>
     <p:spTree>
       <p:nvGrpSpPr>
-        <p:cNvPr id="94" name="Shape 94"/>
+        <p:cNvPr id="95" name="Shape 95"/>
         <p:cNvGrpSpPr/>
         <p:nvPr/>
       </p:nvGrpSpPr>
@@ -2000,7 +2040,7 @@
       </p:grpSpPr>
       <p:sp>
         <p:nvSpPr>
-          <p:cNvPr id="95" name="Google Shape;95;gce690ed560_0_96:notes"/>
+          <p:cNvPr id="96" name="Google Shape;96;gce690ed560_0_96:notes"/>
           <p:cNvSpPr/>
           <p:nvPr>
             <p:ph idx="2" type="sldImg"/>
@@ -2035,7 +2075,7 @@
       </p:sp>
       <p:sp>
         <p:nvSpPr>
-          <p:cNvPr id="96" name="Google Shape;96;gce690ed560_0_96:notes"/>
+          <p:cNvPr id="97" name="Google Shape;97;gce690ed560_0_96:notes"/>
           <p:cNvSpPr txBox="1"/>
           <p:nvPr>
             <p:ph idx="1" type="body"/>
@@ -2180,7 +2220,7 @@
   <p:cSld>
     <p:spTree>
       <p:nvGrpSpPr>
-        <p:cNvPr id="103" name="Shape 103"/>
+        <p:cNvPr id="104" name="Shape 104"/>
         <p:cNvGrpSpPr/>
         <p:nvPr/>
       </p:nvGrpSpPr>
@@ -2194,7 +2234,7 @@
       </p:grpSpPr>
       <p:sp>
         <p:nvSpPr>
-          <p:cNvPr id="104" name="Google Shape;104;gce690ed560_0_811:notes"/>
+          <p:cNvPr id="105" name="Google Shape;105;gce690ed560_0_811:notes"/>
           <p:cNvSpPr/>
           <p:nvPr>
             <p:ph idx="2" type="sldImg"/>
@@ -2229,7 +2269,7 @@
       </p:sp>
       <p:sp>
         <p:nvSpPr>
-          <p:cNvPr id="105" name="Google Shape;105;gce690ed560_0_811:notes"/>
+          <p:cNvPr id="106" name="Google Shape;106;gce690ed560_0_811:notes"/>
           <p:cNvSpPr txBox="1"/>
           <p:nvPr>
             <p:ph idx="1" type="body"/>
@@ -2423,7 +2463,7 @@
   <p:cSld>
     <p:spTree>
       <p:nvGrpSpPr>
-        <p:cNvPr id="112" name="Shape 112"/>
+        <p:cNvPr id="113" name="Shape 113"/>
         <p:cNvGrpSpPr/>
         <p:nvPr/>
       </p:nvGrpSpPr>
@@ -2437,7 +2477,7 @@
       </p:grpSpPr>
       <p:sp>
         <p:nvSpPr>
-          <p:cNvPr id="113" name="Google Shape;113;gce690ed560_0_55:notes"/>
+          <p:cNvPr id="114" name="Google Shape;114;gce690ed560_0_55:notes"/>
           <p:cNvSpPr/>
           <p:nvPr>
             <p:ph idx="2" type="sldImg"/>
@@ -2472,7 +2512,7 @@
       </p:sp>
       <p:sp>
         <p:nvSpPr>
-          <p:cNvPr id="114" name="Google Shape;114;gce690ed560_0_55:notes"/>
+          <p:cNvPr id="115" name="Google Shape;115;gce690ed560_0_55:notes"/>
           <p:cNvSpPr txBox="1"/>
           <p:nvPr>
             <p:ph idx="1" type="body"/>
@@ -2572,7 +2612,7 @@
             </a:pPr>
             <a:r>
               <a:rPr lang="en"/>
-              <a:t>The map shown here is </a:t>
+              <a:t>The map shown here, pulled from the college board website, is </a:t>
             </a:r>
             <a:r>
               <a:rPr lang="en"/>
@@ -2681,7 +2721,7 @@
   <p:cSld>
     <p:spTree>
       <p:nvGrpSpPr>
-        <p:cNvPr id="120" name="Shape 120"/>
+        <p:cNvPr id="121" name="Shape 121"/>
         <p:cNvGrpSpPr/>
         <p:nvPr/>
       </p:nvGrpSpPr>
@@ -2695,7 +2735,7 @@
       </p:grpSpPr>
       <p:sp>
         <p:nvSpPr>
-          <p:cNvPr id="121" name="Google Shape;121;gce690ed560_0_821:notes"/>
+          <p:cNvPr id="122" name="Google Shape;122;gce690ed560_0_821:notes"/>
           <p:cNvSpPr/>
           <p:nvPr>
             <p:ph idx="2" type="sldImg"/>
@@ -2730,7 +2770,7 @@
       </p:sp>
       <p:sp>
         <p:nvSpPr>
-          <p:cNvPr id="122" name="Google Shape;122;gce690ed560_0_821:notes"/>
+          <p:cNvPr id="123" name="Google Shape;123;gce690ed560_0_821:notes"/>
           <p:cNvSpPr txBox="1"/>
           <p:nvPr>
             <p:ph idx="1" type="body"/>
@@ -9013,7 +9053,7 @@
   <p:cSld>
     <p:spTree>
       <p:nvGrpSpPr>
-        <p:cNvPr id="131" name="Shape 131"/>
+        <p:cNvPr id="132" name="Shape 132"/>
         <p:cNvGrpSpPr/>
         <p:nvPr/>
       </p:nvGrpSpPr>
@@ -9027,7 +9067,7 @@
       </p:grpSpPr>
       <p:sp>
         <p:nvSpPr>
-          <p:cNvPr id="132" name="Google Shape;132;p22"/>
+          <p:cNvPr id="133" name="Google Shape;133;p22"/>
           <p:cNvSpPr txBox="1"/>
           <p:nvPr>
             <p:ph type="title"/>
@@ -9067,7 +9107,7 @@
       </p:sp>
       <p:sp>
         <p:nvSpPr>
-          <p:cNvPr id="133" name="Google Shape;133;p22"/>
+          <p:cNvPr id="134" name="Google Shape;134;p22"/>
           <p:cNvSpPr txBox="1"/>
           <p:nvPr>
             <p:ph idx="1" type="body"/>
@@ -9719,6 +9759,58 @@
           </a:ln>
         </p:spPr>
       </p:pic>
+      <p:sp>
+        <p:nvSpPr>
+          <p:cNvPr id="87" name="Google Shape;87;p16"/>
+          <p:cNvSpPr txBox="1"/>
+          <p:nvPr/>
+        </p:nvSpPr>
+        <p:spPr>
+          <a:xfrm>
+            <a:off x="0" y="4866600"/>
+            <a:ext cx="4311600" cy="276900"/>
+          </a:xfrm>
+          <a:prstGeom prst="rect">
+            <a:avLst/>
+          </a:prstGeom>
+          <a:noFill/>
+          <a:ln>
+            <a:noFill/>
+          </a:ln>
+        </p:spPr>
+        <p:txBody>
+          <a:bodyPr anchorCtr="0" anchor="t" bIns="91425" lIns="91425" spcFirstLastPara="1" rIns="91425" wrap="square" tIns="91425">
+            <a:spAutoFit/>
+          </a:bodyPr>
+          <a:lstStyle/>
+          <a:p>
+            <a:pPr indent="0" lvl="0" marL="0" rtl="0" algn="l">
+              <a:spcBef>
+                <a:spcPts val="0"/>
+              </a:spcBef>
+              <a:spcAft>
+                <a:spcPts val="0"/>
+              </a:spcAft>
+              <a:buNone/>
+            </a:pPr>
+            <a:r>
+              <a:rPr lang="en" sz="600">
+                <a:latin typeface="Roboto"/>
+                <a:ea typeface="Roboto"/>
+                <a:cs typeface="Roboto"/>
+                <a:sym typeface="Roboto"/>
+              </a:rPr>
+              <a:t>https://reports.collegeboard.org/pdf/2017-total-group-sat-suite-assessments-annual-report.pdf</a:t>
+            </a:r>
+            <a:endParaRPr sz="600">
+              <a:latin typeface="Roboto"/>
+              <a:ea typeface="Roboto"/>
+              <a:cs typeface="Roboto"/>
+              <a:sym typeface="Roboto"/>
+            </a:endParaRPr>
+          </a:p>
+        </p:txBody>
+      </p:sp>
     </p:spTree>
   </p:cSld>
   <p:clrMapOvr>
@@ -9732,7 +9824,7 @@
   <p:cSld>
     <p:spTree>
       <p:nvGrpSpPr>
-        <p:cNvPr id="90" name="Shape 90"/>
+        <p:cNvPr id="91" name="Shape 91"/>
         <p:cNvGrpSpPr/>
         <p:nvPr/>
       </p:nvGrpSpPr>
@@ -9746,7 +9838,7 @@
       </p:grpSpPr>
       <p:sp>
         <p:nvSpPr>
-          <p:cNvPr id="91" name="Google Shape;91;p17"/>
+          <p:cNvPr id="92" name="Google Shape;92;p17"/>
           <p:cNvSpPr txBox="1"/>
           <p:nvPr>
             <p:ph type="title"/>
@@ -9786,7 +9878,7 @@
       </p:sp>
       <p:sp>
         <p:nvSpPr>
-          <p:cNvPr id="92" name="Google Shape;92;p17"/>
+          <p:cNvPr id="93" name="Google Shape;93;p17"/>
           <p:cNvSpPr txBox="1"/>
           <p:nvPr>
             <p:ph idx="2" type="body"/>
@@ -9896,7 +9988,7 @@
       </p:sp>
       <p:pic>
         <p:nvPicPr>
-          <p:cNvPr id="93" name="Google Shape;93;p17"/>
+          <p:cNvPr id="94" name="Google Shape;94;p17"/>
           <p:cNvPicPr preferRelativeResize="0"/>
           <p:nvPr/>
         </p:nvPicPr>
@@ -9935,7 +10027,7 @@
   <p:cSld>
     <p:spTree>
       <p:nvGrpSpPr>
-        <p:cNvPr id="97" name="Shape 97"/>
+        <p:cNvPr id="98" name="Shape 98"/>
         <p:cNvGrpSpPr/>
         <p:nvPr/>
       </p:nvGrpSpPr>
@@ -9949,7 +10041,7 @@
       </p:grpSpPr>
       <p:sp>
         <p:nvSpPr>
-          <p:cNvPr id="98" name="Google Shape;98;p18"/>
+          <p:cNvPr id="99" name="Google Shape;99;p18"/>
           <p:cNvSpPr txBox="1"/>
           <p:nvPr>
             <p:ph type="title"/>
@@ -9989,7 +10081,7 @@
       </p:sp>
       <p:pic>
         <p:nvPicPr>
-          <p:cNvPr id="99" name="Google Shape;99;p18"/>
+          <p:cNvPr id="100" name="Google Shape;100;p18"/>
           <p:cNvPicPr preferRelativeResize="0"/>
           <p:nvPr/>
         </p:nvPicPr>
@@ -10017,7 +10109,7 @@
       </p:pic>
       <p:pic>
         <p:nvPicPr>
-          <p:cNvPr id="100" name="Google Shape;100;p18"/>
+          <p:cNvPr id="101" name="Google Shape;101;p18"/>
           <p:cNvPicPr preferRelativeResize="0"/>
           <p:nvPr/>
         </p:nvPicPr>
@@ -10045,7 +10137,7 @@
       </p:pic>
       <p:sp>
         <p:nvSpPr>
-          <p:cNvPr id="101" name="Google Shape;101;p18"/>
+          <p:cNvPr id="102" name="Google Shape;102;p18"/>
           <p:cNvSpPr txBox="1"/>
           <p:nvPr/>
         </p:nvSpPr>
@@ -10103,7 +10195,7 @@
       </p:sp>
       <p:sp>
         <p:nvSpPr>
-          <p:cNvPr id="102" name="Google Shape;102;p18"/>
+          <p:cNvPr id="103" name="Google Shape;103;p18"/>
           <p:cNvSpPr txBox="1"/>
           <p:nvPr/>
         </p:nvSpPr>
@@ -10184,7 +10276,7 @@
   <p:cSld>
     <p:spTree>
       <p:nvGrpSpPr>
-        <p:cNvPr id="106" name="Shape 106"/>
+        <p:cNvPr id="107" name="Shape 107"/>
         <p:cNvGrpSpPr/>
         <p:nvPr/>
       </p:nvGrpSpPr>
@@ -10198,7 +10290,7 @@
       </p:grpSpPr>
       <p:sp>
         <p:nvSpPr>
-          <p:cNvPr id="107" name="Google Shape;107;p19"/>
+          <p:cNvPr id="108" name="Google Shape;108;p19"/>
           <p:cNvSpPr txBox="1"/>
           <p:nvPr>
             <p:ph type="title"/>
@@ -10238,7 +10330,7 @@
       </p:sp>
       <p:sp>
         <p:nvSpPr>
-          <p:cNvPr id="108" name="Google Shape;108;p19"/>
+          <p:cNvPr id="109" name="Google Shape;109;p19"/>
           <p:cNvSpPr txBox="1"/>
           <p:nvPr>
             <p:ph idx="4294967295" type="subTitle"/>
@@ -10289,7 +10381,7 @@
       </p:sp>
       <p:pic>
         <p:nvPicPr>
-          <p:cNvPr id="109" name="Google Shape;109;p19"/>
+          <p:cNvPr id="110" name="Google Shape;110;p19"/>
           <p:cNvPicPr preferRelativeResize="0"/>
           <p:nvPr/>
         </p:nvPicPr>
@@ -10317,7 +10409,7 @@
       </p:pic>
       <p:sp>
         <p:nvSpPr>
-          <p:cNvPr id="110" name="Google Shape;110;p19"/>
+          <p:cNvPr id="111" name="Google Shape;111;p19"/>
           <p:cNvSpPr txBox="1"/>
           <p:nvPr/>
         </p:nvSpPr>
@@ -10455,7 +10547,7 @@
       </p:sp>
       <p:sp>
         <p:nvSpPr>
-          <p:cNvPr id="111" name="Google Shape;111;p19"/>
+          <p:cNvPr id="112" name="Google Shape;112;p19"/>
           <p:cNvSpPr txBox="1"/>
           <p:nvPr/>
         </p:nvSpPr>
@@ -10520,7 +10612,7 @@
   <p:cSld>
     <p:spTree>
       <p:nvGrpSpPr>
-        <p:cNvPr id="115" name="Shape 115"/>
+        <p:cNvPr id="116" name="Shape 116"/>
         <p:cNvGrpSpPr/>
         <p:nvPr/>
       </p:nvGrpSpPr>
@@ -10534,7 +10626,7 @@
       </p:grpSpPr>
       <p:sp>
         <p:nvSpPr>
-          <p:cNvPr id="116" name="Google Shape;116;p20"/>
+          <p:cNvPr id="117" name="Google Shape;117;p20"/>
           <p:cNvSpPr txBox="1"/>
           <p:nvPr>
             <p:ph type="title"/>
@@ -10574,7 +10666,7 @@
       </p:sp>
       <p:sp>
         <p:nvSpPr>
-          <p:cNvPr id="117" name="Google Shape;117;p20"/>
+          <p:cNvPr id="118" name="Google Shape;118;p20"/>
           <p:cNvSpPr txBox="1"/>
           <p:nvPr/>
         </p:nvSpPr>
@@ -10626,7 +10718,7 @@
       </p:sp>
       <p:pic>
         <p:nvPicPr>
-          <p:cNvPr id="118" name="Google Shape;118;p20"/>
+          <p:cNvPr id="119" name="Google Shape;119;p20"/>
           <p:cNvPicPr preferRelativeResize="0"/>
           <p:nvPr/>
         </p:nvPicPr>
@@ -10654,7 +10746,7 @@
       </p:pic>
       <p:sp>
         <p:nvSpPr>
-          <p:cNvPr id="119" name="Google Shape;119;p20"/>
+          <p:cNvPr id="120" name="Google Shape;120;p20"/>
           <p:cNvSpPr txBox="1"/>
           <p:nvPr/>
         </p:nvSpPr>
@@ -10907,7 +10999,7 @@
   <p:cSld>
     <p:spTree>
       <p:nvGrpSpPr>
-        <p:cNvPr id="123" name="Shape 123"/>
+        <p:cNvPr id="124" name="Shape 124"/>
         <p:cNvGrpSpPr/>
         <p:nvPr/>
       </p:nvGrpSpPr>
@@ -10921,7 +11013,7 @@
       </p:grpSpPr>
       <p:sp>
         <p:nvSpPr>
-          <p:cNvPr id="124" name="Google Shape;124;p21"/>
+          <p:cNvPr id="125" name="Google Shape;125;p21"/>
           <p:cNvSpPr txBox="1"/>
           <p:nvPr>
             <p:ph type="title"/>
@@ -10961,7 +11053,7 @@
       </p:sp>
       <p:graphicFrame>
         <p:nvGraphicFramePr>
-          <p:cNvPr id="125" name="Google Shape;125;p21"/>
+          <p:cNvPr id="126" name="Google Shape;126;p21"/>
           <p:cNvGraphicFramePr/>
           <p:nvPr/>
         </p:nvGraphicFramePr>
@@ -10974,7 +11066,7 @@
             <a:tbl>
               <a:tblPr>
                 <a:noFill/>
-                <a:tableStyleId>{0A0F55E2-C1A8-40FB-97C2-8BC784A7896E}</a:tableStyleId>
+                <a:tableStyleId>{A4278754-7069-49F1-884E-EA8066419767}</a:tableStyleId>
               </a:tblPr>
               <a:tblGrid>
                 <a:gridCol w="2190350"/>
@@ -11452,7 +11544,7 @@
       </p:graphicFrame>
       <p:sp>
         <p:nvSpPr>
-          <p:cNvPr id="126" name="Google Shape;126;p21"/>
+          <p:cNvPr id="127" name="Google Shape;127;p21"/>
           <p:cNvSpPr txBox="1"/>
           <p:nvPr/>
         </p:nvSpPr>
@@ -11658,7 +11750,7 @@
       </p:sp>
       <p:sp>
         <p:nvSpPr>
-          <p:cNvPr id="127" name="Google Shape;127;p21"/>
+          <p:cNvPr id="128" name="Google Shape;128;p21"/>
           <p:cNvSpPr txBox="1"/>
           <p:nvPr/>
         </p:nvSpPr>

</xml_diff>